<commit_message>
Tulsa TechFest 2015 - SOLID DB Web API demo
</commit_message>
<xml_diff>
--- a/Presentations/AngularJS - WebAPI - CORS -Tulsa TechFest 2014.pptx
+++ b/Presentations/AngularJS - WebAPI - CORS -Tulsa TechFest 2014.pptx
@@ -123,7 +123,7 @@
   </p:defaultTextStyle>
   <p:extLst>
     <p:ext uri="{EFAFB233-063F-42B5-8137-9DF3F51BA10A}">
-      <p15:sldGuideLst xmlns:p15="http://schemas.microsoft.com/office/powerpoint/2012/main" xmlns="">
+      <p15:sldGuideLst xmlns:p15="http://schemas.microsoft.com/office/powerpoint/2012/main">
         <p15:guide id="1" orient="horz" pos="144">
           <p15:clr>
             <a:srgbClr val="A4A3A4"/>
@@ -187,7 +187,7 @@
       </p15:sldGuideLst>
     </p:ext>
     <p:ext uri="{2D200454-40CA-4A62-9FC3-DE9A4176ACB9}">
-      <p15:notesGuideLst xmlns:p15="http://schemas.microsoft.com/office/powerpoint/2012/main" xmlns="">
+      <p15:notesGuideLst xmlns:p15="http://schemas.microsoft.com/office/powerpoint/2012/main">
         <p15:guide id="1" orient="horz" pos="2880">
           <p15:clr>
             <a:srgbClr val="A4A3A4"/>
@@ -303,7 +303,7 @@
                 <a:latin typeface="Segoe UI" pitchFamily="34" charset="0"/>
               </a:rPr>
               <a:pPr/>
-              <a:t>8/14/2014</a:t>
+              <a:t>8/6/2015</a:t>
             </a:fld>
             <a:endParaRPr lang="en-US" dirty="0">
               <a:latin typeface="Segoe UI" pitchFamily="34" charset="0"/>
@@ -453,7 +453,7 @@
             <a:fld id="{7C3FBCD4-166E-446F-AF18-7D4A0CF9AEF6}" type="datetimeFigureOut">
               <a:rPr lang="en-US" smtClean="0"/>
               <a:pPr/>
-              <a:t>8/14/2014</a:t>
+              <a:t>8/6/2015</a:t>
             </a:fld>
             <a:endParaRPr lang="en-US" dirty="0"/>
           </a:p>
@@ -893,7 +893,7 @@
             <a:fld id="{81331B57-0BE5-4F82-AA58-76F53EFF3ADA}" type="datetime8">
               <a:rPr lang="en-US" smtClean="0"/>
               <a:pPr/>
-              <a:t>8/14/2014 11:05 PM</a:t>
+              <a:t>8/6/2015 4:10 PM</a:t>
             </a:fld>
             <a:endParaRPr lang="en-US" dirty="0"/>
           </a:p>
@@ -1117,7 +1117,7 @@
               <a:pPr>
                 <a:defRPr/>
               </a:pPr>
-              <a:t>8/14/2014</a:t>
+              <a:t>8/6/2015</a:t>
             </a:fld>
             <a:endParaRPr lang="en-US" dirty="0"/>
           </a:p>
@@ -1346,7 +1346,7 @@
               <a:pPr>
                 <a:defRPr/>
               </a:pPr>
-              <a:t>8/14/2014</a:t>
+              <a:t>8/6/2015</a:t>
             </a:fld>
             <a:endParaRPr lang="en-US" dirty="0"/>
           </a:p>
@@ -1551,7 +1551,7 @@
             <a:fld id="{81331B57-0BE5-4F82-AA58-76F53EFF3ADA}" type="datetime8">
               <a:rPr lang="en-US" smtClean="0"/>
               <a:pPr/>
-              <a:t>8/14/2014 11:05 PM</a:t>
+              <a:t>8/6/2015 4:10 PM</a:t>
             </a:fld>
             <a:endParaRPr lang="en-US" dirty="0"/>
           </a:p>
@@ -1916,7 +1916,7 @@
                 </a:spcAft>
                 <a:defRPr/>
               </a:pPr>
-              <a:t>8/14/2014</a:t>
+              <a:t>8/6/2015</a:t>
             </a:fld>
             <a:endParaRPr lang="en-US" dirty="0"/>
           </a:p>
@@ -2225,7 +2225,7 @@
                 </a:spcAft>
                 <a:defRPr/>
               </a:pPr>
-              <a:t>8/14/2014</a:t>
+              <a:t>8/6/2015</a:t>
             </a:fld>
             <a:endParaRPr lang="en-US" dirty="0"/>
           </a:p>
@@ -2534,7 +2534,7 @@
                 </a:spcAft>
                 <a:defRPr/>
               </a:pPr>
-              <a:t>8/14/2014</a:t>
+              <a:t>8/6/2015</a:t>
             </a:fld>
             <a:endParaRPr lang="en-US" dirty="0"/>
           </a:p>
@@ -2843,7 +2843,7 @@
                 </a:spcAft>
                 <a:defRPr/>
               </a:pPr>
-              <a:t>8/14/2014</a:t>
+              <a:t>8/6/2015</a:t>
             </a:fld>
             <a:endParaRPr lang="en-US" dirty="0"/>
           </a:p>
@@ -3152,7 +3152,7 @@
                 </a:spcAft>
                 <a:defRPr/>
               </a:pPr>
-              <a:t>8/14/2014</a:t>
+              <a:t>8/6/2015</a:t>
             </a:fld>
             <a:endParaRPr lang="en-US" dirty="0"/>
           </a:p>
@@ -3456,7 +3456,7 @@
                 </a:spcAft>
                 <a:defRPr/>
               </a:pPr>
-              <a:t>8/14/2014</a:t>
+              <a:t>8/6/2015</a:t>
             </a:fld>
             <a:endParaRPr lang="en-US" dirty="0"/>
           </a:p>
@@ -3830,7 +3830,7 @@
                 </a:spcAft>
                 <a:defRPr/>
               </a:pPr>
-              <a:t>8/14/2014</a:t>
+              <a:t>8/6/2015</a:t>
             </a:fld>
             <a:endParaRPr lang="en-US" dirty="0"/>
           </a:p>
@@ -8055,7 +8055,7 @@
         </p:nvSpPr>
         <p:spPr>
           <a:xfrm>
-            <a:off x="381000" y="228600"/>
+            <a:off x="409575" y="228600"/>
             <a:ext cx="8382000" cy="609398"/>
           </a:xfrm>
         </p:spPr>

</xml_diff>